<commit_message>
#561 fixed missing file.
</commit_message>
<xml_diff>
--- a/Articles/561/images/REST API.pptx
+++ b/Articles/561/images/REST API.pptx
@@ -12432,6 +12432,254 @@
           </a:p>
         </p:txBody>
       </p:sp>
+      <p:sp>
+        <p:nvSpPr>
+          <p:cNvPr id="9" name="Oval 8">
+            <a:extLst>
+              <a:ext uri="{FF2B5EF4-FFF2-40B4-BE49-F238E27FC236}">
+                <a16:creationId xmlns:a16="http://schemas.microsoft.com/office/drawing/2014/main" id="{D47ABC21-52F1-FC3D-6F28-A6113F3B704D}"/>
+              </a:ext>
+            </a:extLst>
+          </p:cNvPr>
+          <p:cNvSpPr/>
+          <p:nvPr/>
+        </p:nvSpPr>
+        <p:spPr>
+          <a:xfrm>
+            <a:off x="3169328" y="2097741"/>
+            <a:ext cx="364565" cy="441270"/>
+          </a:xfrm>
+          <a:prstGeom prst="ellipse">
+            <a:avLst/>
+          </a:prstGeom>
+          <a:noFill/>
+          <a:ln>
+            <a:solidFill>
+              <a:schemeClr val="tx1"/>
+            </a:solidFill>
+          </a:ln>
+        </p:spPr>
+        <p:style>
+          <a:lnRef idx="1">
+            <a:schemeClr val="accent1"/>
+          </a:lnRef>
+          <a:fillRef idx="3">
+            <a:schemeClr val="accent1"/>
+          </a:fillRef>
+          <a:effectRef idx="2">
+            <a:schemeClr val="accent1"/>
+          </a:effectRef>
+          <a:fontRef idx="minor">
+            <a:schemeClr val="lt1"/>
+          </a:fontRef>
+        </p:style>
+        <p:txBody>
+          <a:bodyPr rtlCol="0" anchor="ctr"/>
+          <a:lstStyle/>
+          <a:p>
+            <a:pPr algn="ctr"/>
+            <a:r>
+              <a:rPr lang="en-GB" dirty="0">
+                <a:solidFill>
+                  <a:schemeClr val="tx1"/>
+                </a:solidFill>
+              </a:rPr>
+              <a:t>1</a:t>
+            </a:r>
+            <a:endParaRPr lang="en-NL" dirty="0">
+              <a:solidFill>
+                <a:schemeClr val="tx1"/>
+              </a:solidFill>
+            </a:endParaRPr>
+          </a:p>
+        </p:txBody>
+      </p:sp>
+      <p:sp>
+        <p:nvSpPr>
+          <p:cNvPr id="12" name="Oval 11">
+            <a:extLst>
+              <a:ext uri="{FF2B5EF4-FFF2-40B4-BE49-F238E27FC236}">
+                <a16:creationId xmlns:a16="http://schemas.microsoft.com/office/drawing/2014/main" id="{6D2822B0-AAAC-34C3-CD0F-F8C32AA14A16}"/>
+              </a:ext>
+            </a:extLst>
+          </p:cNvPr>
+          <p:cNvSpPr/>
+          <p:nvPr/>
+        </p:nvSpPr>
+        <p:spPr>
+          <a:xfrm>
+            <a:off x="7344491" y="2168996"/>
+            <a:ext cx="364565" cy="441270"/>
+          </a:xfrm>
+          <a:prstGeom prst="ellipse">
+            <a:avLst/>
+          </a:prstGeom>
+          <a:noFill/>
+          <a:ln>
+            <a:solidFill>
+              <a:schemeClr val="tx1"/>
+            </a:solidFill>
+          </a:ln>
+        </p:spPr>
+        <p:style>
+          <a:lnRef idx="1">
+            <a:schemeClr val="accent1"/>
+          </a:lnRef>
+          <a:fillRef idx="3">
+            <a:schemeClr val="accent1"/>
+          </a:fillRef>
+          <a:effectRef idx="2">
+            <a:schemeClr val="accent1"/>
+          </a:effectRef>
+          <a:fontRef idx="minor">
+            <a:schemeClr val="lt1"/>
+          </a:fontRef>
+        </p:style>
+        <p:txBody>
+          <a:bodyPr rtlCol="0" anchor="ctr"/>
+          <a:lstStyle/>
+          <a:p>
+            <a:pPr algn="ctr"/>
+            <a:r>
+              <a:rPr lang="en-GB" dirty="0">
+                <a:solidFill>
+                  <a:schemeClr val="tx1"/>
+                </a:solidFill>
+              </a:rPr>
+              <a:t>2</a:t>
+            </a:r>
+            <a:endParaRPr lang="en-NL" dirty="0">
+              <a:solidFill>
+                <a:schemeClr val="tx1"/>
+              </a:solidFill>
+            </a:endParaRPr>
+          </a:p>
+        </p:txBody>
+      </p:sp>
+      <p:sp>
+        <p:nvSpPr>
+          <p:cNvPr id="13" name="Oval 12">
+            <a:extLst>
+              <a:ext uri="{FF2B5EF4-FFF2-40B4-BE49-F238E27FC236}">
+                <a16:creationId xmlns:a16="http://schemas.microsoft.com/office/drawing/2014/main" id="{9D06CED9-4016-B4F9-545A-1F0E8ECB3AB2}"/>
+              </a:ext>
+            </a:extLst>
+          </p:cNvPr>
+          <p:cNvSpPr/>
+          <p:nvPr/>
+        </p:nvSpPr>
+        <p:spPr>
+          <a:xfrm>
+            <a:off x="7336342" y="3302600"/>
+            <a:ext cx="364565" cy="441270"/>
+          </a:xfrm>
+          <a:prstGeom prst="ellipse">
+            <a:avLst/>
+          </a:prstGeom>
+          <a:noFill/>
+          <a:ln>
+            <a:solidFill>
+              <a:schemeClr val="tx1"/>
+            </a:solidFill>
+          </a:ln>
+        </p:spPr>
+        <p:style>
+          <a:lnRef idx="1">
+            <a:schemeClr val="accent1"/>
+          </a:lnRef>
+          <a:fillRef idx="3">
+            <a:schemeClr val="accent1"/>
+          </a:fillRef>
+          <a:effectRef idx="2">
+            <a:schemeClr val="accent1"/>
+          </a:effectRef>
+          <a:fontRef idx="minor">
+            <a:schemeClr val="lt1"/>
+          </a:fontRef>
+        </p:style>
+        <p:txBody>
+          <a:bodyPr rtlCol="0" anchor="ctr"/>
+          <a:lstStyle/>
+          <a:p>
+            <a:pPr algn="ctr"/>
+            <a:r>
+              <a:rPr lang="en-GB" dirty="0">
+                <a:solidFill>
+                  <a:schemeClr val="tx1"/>
+                </a:solidFill>
+              </a:rPr>
+              <a:t>3</a:t>
+            </a:r>
+            <a:endParaRPr lang="en-NL" dirty="0">
+              <a:solidFill>
+                <a:schemeClr val="tx1"/>
+              </a:solidFill>
+            </a:endParaRPr>
+          </a:p>
+        </p:txBody>
+      </p:sp>
+      <p:sp>
+        <p:nvSpPr>
+          <p:cNvPr id="16" name="Oval 15">
+            <a:extLst>
+              <a:ext uri="{FF2B5EF4-FFF2-40B4-BE49-F238E27FC236}">
+                <a16:creationId xmlns:a16="http://schemas.microsoft.com/office/drawing/2014/main" id="{CDCD7129-6B7D-F7C3-8A64-FCAB4DB2D5F2}"/>
+              </a:ext>
+            </a:extLst>
+          </p:cNvPr>
+          <p:cNvSpPr/>
+          <p:nvPr/>
+        </p:nvSpPr>
+        <p:spPr>
+          <a:xfrm>
+            <a:off x="3199134" y="3286630"/>
+            <a:ext cx="364565" cy="441270"/>
+          </a:xfrm>
+          <a:prstGeom prst="ellipse">
+            <a:avLst/>
+          </a:prstGeom>
+          <a:noFill/>
+          <a:ln>
+            <a:solidFill>
+              <a:schemeClr val="tx1"/>
+            </a:solidFill>
+          </a:ln>
+        </p:spPr>
+        <p:style>
+          <a:lnRef idx="1">
+            <a:schemeClr val="accent1"/>
+          </a:lnRef>
+          <a:fillRef idx="3">
+            <a:schemeClr val="accent1"/>
+          </a:fillRef>
+          <a:effectRef idx="2">
+            <a:schemeClr val="accent1"/>
+          </a:effectRef>
+          <a:fontRef idx="minor">
+            <a:schemeClr val="lt1"/>
+          </a:fontRef>
+        </p:style>
+        <p:txBody>
+          <a:bodyPr rtlCol="0" anchor="ctr"/>
+          <a:lstStyle/>
+          <a:p>
+            <a:pPr algn="ctr"/>
+            <a:r>
+              <a:rPr lang="en-GB" dirty="0">
+                <a:solidFill>
+                  <a:schemeClr val="tx1"/>
+                </a:solidFill>
+              </a:rPr>
+              <a:t>4</a:t>
+            </a:r>
+            <a:endParaRPr lang="en-NL" dirty="0">
+              <a:solidFill>
+                <a:schemeClr val="tx1"/>
+              </a:solidFill>
+            </a:endParaRPr>
+          </a:p>
+        </p:txBody>
+      </p:sp>
     </p:spTree>
     <p:extLst>
       <p:ext uri="{BB962C8B-B14F-4D97-AF65-F5344CB8AC3E}">
@@ -14336,18 +14584,18 @@
 </file>
 
 <file path=customXml/item1.xml><?xml version="1.0" encoding="utf-8"?>
+<p:properties xmlns:p="http://schemas.microsoft.com/office/2006/metadata/properties" xmlns:xsi="http://www.w3.org/2001/XMLSchema-instance" xmlns:pc="http://schemas.microsoft.com/office/infopath/2007/PartnerControls">
+  <documentManagement/>
+</p:properties>
+</file>
+
+<file path=customXml/item2.xml><?xml version="1.0" encoding="utf-8"?>
 <?mso-contentType ?>
 <FormTemplates xmlns="http://schemas.microsoft.com/sharepoint/v3/contenttype/forms">
   <Display>DocumentLibraryForm</Display>
   <Edit>DocumentLibraryForm</Edit>
   <New>DocumentLibraryForm</New>
 </FormTemplates>
-</file>
-
-<file path=customXml/item2.xml><?xml version="1.0" encoding="utf-8"?>
-<p:properties xmlns:p="http://schemas.microsoft.com/office/2006/metadata/properties" xmlns:xsi="http://www.w3.org/2001/XMLSchema-instance" xmlns:pc="http://schemas.microsoft.com/office/infopath/2007/PartnerControls">
-  <documentManagement/>
-</p:properties>
 </file>
 
 <file path=customXml/item3.xml><?xml version="1.0" encoding="utf-8"?>
@@ -14505,14 +14753,6 @@
 </file>
 
 <file path=customXml/itemProps1.xml><?xml version="1.0" encoding="utf-8"?>
-<ds:datastoreItem xmlns:ds="http://schemas.openxmlformats.org/officeDocument/2006/customXml" ds:itemID="{74BCA57B-8451-400D-AF6D-A9DBB4806AF2}">
-  <ds:schemaRefs>
-    <ds:schemaRef ds:uri="http://schemas.microsoft.com/sharepoint/v3/contenttype/forms"/>
-  </ds:schemaRefs>
-</ds:datastoreItem>
-</file>
-
-<file path=customXml/itemProps2.xml><?xml version="1.0" encoding="utf-8"?>
 <ds:datastoreItem xmlns:ds="http://schemas.openxmlformats.org/officeDocument/2006/customXml" ds:itemID="{F4BD4880-0C9A-491D-872C-CB84E58DA4AE}">
   <ds:schemaRefs>
     <ds:schemaRef ds:uri="67d1ba68-3275-44c2-9ddb-2f8511f2ccbb"/>
@@ -14524,6 +14764,14 @@
     <ds:schemaRef ds:uri="http://schemas.microsoft.com/office/2006/metadata/properties"/>
     <ds:schemaRef ds:uri="http://www.w3.org/XML/1998/namespace"/>
     <ds:schemaRef ds:uri="http://purl.org/dc/dcmitype/"/>
+  </ds:schemaRefs>
+</ds:datastoreItem>
+</file>
+
+<file path=customXml/itemProps2.xml><?xml version="1.0" encoding="utf-8"?>
+<ds:datastoreItem xmlns:ds="http://schemas.openxmlformats.org/officeDocument/2006/customXml" ds:itemID="{74BCA57B-8451-400D-AF6D-A9DBB4806AF2}">
+  <ds:schemaRefs>
+    <ds:schemaRef ds:uri="http://schemas.microsoft.com/sharepoint/v3/contenttype/forms"/>
   </ds:schemaRefs>
 </ds:datastoreItem>
 </file>

</xml_diff>

<commit_message>
#561 #562: Upper case on titles.
Former-commit-id: d2f360c0a4210f50fd8ce4c4c9e2bbc1dd3cea24
</commit_message>
<xml_diff>
--- a/Articles/561/images/REST API.pptx
+++ b/Articles/561/images/REST API.pptx
@@ -1616,7 +1616,7 @@
             <a:fld id="{B1603AB5-52B7-8045-BEFE-97F8347DAEAC}" type="datetimeFigureOut">
               <a:rPr lang="en-US" smtClean="0"/>
               <a:pPr/>
-              <a:t>11/8/2022</a:t>
+              <a:t>12/2/2024</a:t>
             </a:fld>
             <a:endParaRPr lang="en-US"/>
           </a:p>
@@ -1784,7 +1784,7 @@
             <a:fld id="{EFF03303-0379-0E48-9B93-EC7286F8FEE5}" type="datetimeFigureOut">
               <a:rPr lang="en-US" smtClean="0"/>
               <a:pPr/>
-              <a:t>11/8/2022</a:t>
+              <a:t>12/2/2024</a:t>
             </a:fld>
             <a:endParaRPr lang="en-US"/>
           </a:p>
@@ -9240,8 +9240,11 @@
             <a:avLst/>
           </a:prstGeom>
           <a:solidFill>
-            <a:srgbClr val="FFFF99"/>
+            <a:schemeClr val="accent2"/>
           </a:solidFill>
+          <a:ln>
+            <a:noFill/>
+          </a:ln>
         </p:spPr>
         <p:style>
           <a:lnRef idx="1">
@@ -9275,35 +9278,42 @@
             </a:endParaRPr>
           </a:p>
           <a:p>
+            <a:pPr algn="ctr"/>
             <a:r>
               <a:rPr lang="en-GB" dirty="0">
                 <a:solidFill>
-                  <a:schemeClr val="tx1"/>
+                  <a:schemeClr val="bg1"/>
                 </a:solidFill>
+                <a:latin typeface="Avenir Next LT Pro" panose="020B0504020202020204" pitchFamily="34" charset="0"/>
               </a:rPr>
               <a:t>Client App</a:t>
             </a:r>
           </a:p>
           <a:p>
+            <a:pPr algn="ctr"/>
             <a:endParaRPr lang="en-GB" dirty="0">
               <a:solidFill>
-                <a:schemeClr val="tx1"/>
+                <a:schemeClr val="bg1"/>
               </a:solidFill>
+              <a:latin typeface="Avenir Next LT Pro" panose="020B0504020202020204" pitchFamily="34" charset="0"/>
             </a:endParaRPr>
           </a:p>
           <a:p>
+            <a:pPr algn="ctr"/>
             <a:r>
               <a:rPr lang="en-GB" dirty="0">
                 <a:solidFill>
-                  <a:schemeClr val="tx1"/>
+                  <a:schemeClr val="bg1"/>
                 </a:solidFill>
+                <a:latin typeface="Avenir Next LT Pro" panose="020B0504020202020204" pitchFamily="34" charset="0"/>
               </a:rPr>
               <a:t>Any Language</a:t>
             </a:r>
             <a:endParaRPr lang="en-NL" dirty="0">
               <a:solidFill>
-                <a:schemeClr val="tx1"/>
+                <a:schemeClr val="bg1"/>
               </a:solidFill>
+              <a:latin typeface="Avenir Next LT Pro" panose="020B0504020202020204" pitchFamily="34" charset="0"/>
             </a:endParaRPr>
           </a:p>
         </p:txBody>
@@ -9329,7 +9339,7 @@
             <a:avLst/>
           </a:prstGeom>
           <a:solidFill>
-            <a:srgbClr val="FFC000"/>
+            <a:schemeClr val="accent1"/>
           </a:solidFill>
         </p:spPr>
         <p:style>
@@ -9350,26 +9360,43 @@
           <a:bodyPr rtlCol="0" anchor="t" anchorCtr="0"/>
           <a:lstStyle/>
           <a:p>
-            <a:endParaRPr lang="en-GB" dirty="0"/>
-          </a:p>
-          <a:p>
-            <a:endParaRPr lang="en-GB" dirty="0"/>
-          </a:p>
-          <a:p>
-            <a:r>
-              <a:rPr lang="en-GB" dirty="0"/>
+            <a:pPr algn="ctr"/>
+            <a:endParaRPr lang="en-GB" dirty="0">
+              <a:latin typeface="Avenir Next LT Pro" panose="020B0504020202020204" pitchFamily="34" charset="0"/>
+            </a:endParaRPr>
+          </a:p>
+          <a:p>
+            <a:pPr algn="ctr"/>
+            <a:endParaRPr lang="en-GB" dirty="0">
+              <a:latin typeface="Avenir Next LT Pro" panose="020B0504020202020204" pitchFamily="34" charset="0"/>
+            </a:endParaRPr>
+          </a:p>
+          <a:p>
+            <a:pPr algn="ctr"/>
+            <a:r>
+              <a:rPr lang="en-GB" dirty="0">
+                <a:latin typeface="Avenir Next LT Pro" panose="020B0504020202020204" pitchFamily="34" charset="0"/>
+              </a:rPr>
               <a:t>Server App</a:t>
             </a:r>
           </a:p>
           <a:p>
-            <a:endParaRPr lang="en-GB" dirty="0"/>
-          </a:p>
-          <a:p>
-            <a:r>
-              <a:rPr lang="en-GB" dirty="0"/>
+            <a:pPr algn="ctr"/>
+            <a:endParaRPr lang="en-GB" dirty="0">
+              <a:latin typeface="Avenir Next LT Pro" panose="020B0504020202020204" pitchFamily="34" charset="0"/>
+            </a:endParaRPr>
+          </a:p>
+          <a:p>
+            <a:pPr algn="ctr"/>
+            <a:r>
+              <a:rPr lang="en-GB" dirty="0">
+                <a:latin typeface="Avenir Next LT Pro" panose="020B0504020202020204" pitchFamily="34" charset="0"/>
+              </a:rPr>
               <a:t>Any Language</a:t>
             </a:r>
-            <a:endParaRPr lang="en-NL" dirty="0"/>
+            <a:endParaRPr lang="en-NL" dirty="0">
+              <a:latin typeface="Avenir Next LT Pro" panose="020B0504020202020204" pitchFamily="34" charset="0"/>
+            </a:endParaRPr>
           </a:p>
         </p:txBody>
       </p:sp>
@@ -9478,8 +9505,8 @@
         </p:nvSpPr>
         <p:spPr>
           <a:xfrm>
-            <a:off x="5351703" y="2239181"/>
-            <a:ext cx="1909036" cy="614970"/>
+            <a:off x="4907819" y="2573599"/>
+            <a:ext cx="3117594" cy="614970"/>
           </a:xfrm>
           <a:prstGeom prst="rect">
             <a:avLst/>
@@ -9492,21 +9519,23 @@
           <a:lstStyle/>
           <a:p>
             <a:r>
-              <a:rPr lang="en-GB" sz="1800" cap="none" baseline="0" dirty="0">
+              <a:rPr lang="en-GB" sz="1400" cap="none" baseline="0" dirty="0">
                 <a:solidFill>
                   <a:schemeClr val="bg1">
                     <a:lumMod val="65000"/>
                   </a:schemeClr>
                 </a:solidFill>
+                <a:latin typeface="Avenir Next LT Pro" panose="020B0504020202020204" pitchFamily="34" charset="0"/>
               </a:rPr>
               <a:t>Request data, server format</a:t>
             </a:r>
-            <a:endParaRPr lang="en-NL" sz="1800" cap="none" baseline="0" dirty="0">
+            <a:endParaRPr lang="en-NL" sz="1400" cap="none" baseline="0" dirty="0">
               <a:solidFill>
                 <a:schemeClr val="bg1">
                   <a:lumMod val="65000"/>
                 </a:schemeClr>
               </a:solidFill>
+              <a:latin typeface="Avenir Next LT Pro" panose="020B0504020202020204" pitchFamily="34" charset="0"/>
             </a:endParaRPr>
           </a:p>
         </p:txBody>
@@ -9525,8 +9554,8 @@
         </p:nvSpPr>
         <p:spPr>
           <a:xfrm>
-            <a:off x="5351703" y="3427894"/>
-            <a:ext cx="1914862" cy="624157"/>
+            <a:off x="4907819" y="3719427"/>
+            <a:ext cx="3127108" cy="624157"/>
           </a:xfrm>
           <a:prstGeom prst="rect">
             <a:avLst/>
@@ -9539,21 +9568,23 @@
           <a:lstStyle/>
           <a:p>
             <a:r>
-              <a:rPr lang="en-GB" sz="1800" cap="none" baseline="0" dirty="0">
+              <a:rPr lang="en-GB" sz="1400" cap="none" baseline="0" dirty="0">
                 <a:solidFill>
                   <a:schemeClr val="bg1">
                     <a:lumMod val="65000"/>
                   </a:schemeClr>
                 </a:solidFill>
+                <a:latin typeface="Avenir Next LT Pro" panose="020B0504020202020204" pitchFamily="34" charset="0"/>
               </a:rPr>
               <a:t>Response data, server format</a:t>
             </a:r>
-            <a:endParaRPr lang="en-NL" sz="1800" cap="none" baseline="0" dirty="0">
+            <a:endParaRPr lang="en-NL" sz="1400" cap="none" baseline="0" dirty="0">
               <a:solidFill>
                 <a:schemeClr val="bg1">
                   <a:lumMod val="65000"/>
                 </a:schemeClr>
               </a:solidFill>
+              <a:latin typeface="Avenir Next LT Pro" panose="020B0504020202020204" pitchFamily="34" charset="0"/>
             </a:endParaRPr>
           </a:p>
         </p:txBody>
@@ -10597,12 +10628,18 @@
         </p:nvSpPr>
         <p:spPr>
           <a:xfrm>
-            <a:off x="2786232" y="2083982"/>
-            <a:ext cx="4280876" cy="2544726"/>
+            <a:off x="2775646" y="2237176"/>
+            <a:ext cx="4280876" cy="1908695"/>
           </a:xfrm>
           <a:prstGeom prst="rect">
             <a:avLst/>
           </a:prstGeom>
+          <a:solidFill>
+            <a:schemeClr val="tx2"/>
+          </a:solidFill>
+          <a:ln>
+            <a:noFill/>
+          </a:ln>
         </p:spPr>
         <p:style>
           <a:lnRef idx="1">
@@ -10624,10 +10661,14 @@
           <a:p>
             <a:pPr algn="ctr"/>
             <a:r>
-              <a:rPr lang="en-GB" dirty="0"/>
+              <a:rPr lang="en-GB" dirty="0">
+                <a:latin typeface="Avenir Next LT Pro" panose="020B0504020202020204" pitchFamily="34" charset="0"/>
+              </a:rPr>
               <a:t>AIMMS Published App</a:t>
             </a:r>
-            <a:endParaRPr lang="en-NL" dirty="0"/>
+            <a:endParaRPr lang="en-NL" dirty="0">
+              <a:latin typeface="Avenir Next LT Pro" panose="020B0504020202020204" pitchFamily="34" charset="0"/>
+            </a:endParaRPr>
           </a:p>
         </p:txBody>
       </p:sp>
@@ -10720,162 +10761,200 @@
           </a:p>
         </p:txBody>
       </p:sp>
-      <p:sp>
-        <p:nvSpPr>
-          <p:cNvPr id="5" name="Rectangle 4">
+      <p:grpSp>
+        <p:nvGrpSpPr>
+          <p:cNvPr id="8" name="Group 7">
             <a:extLst>
               <a:ext uri="{FF2B5EF4-FFF2-40B4-BE49-F238E27FC236}">
-                <a16:creationId xmlns:a16="http://schemas.microsoft.com/office/drawing/2014/main" id="{3BFD8162-564D-510A-E00E-64FDECD0D188}"/>
+                <a16:creationId xmlns:a16="http://schemas.microsoft.com/office/drawing/2014/main" id="{798E450F-8FA0-A09E-1DD4-16CC9AF91F9E}"/>
               </a:ext>
             </a:extLst>
           </p:cNvPr>
-          <p:cNvSpPr/>
+          <p:cNvGrpSpPr/>
           <p:nvPr/>
-        </p:nvSpPr>
-        <p:spPr>
+        </p:nvGrpSpPr>
+        <p:grpSpPr>
           <a:xfrm>
-            <a:off x="3115009" y="2580167"/>
-            <a:ext cx="1909036" cy="1679946"/>
+            <a:off x="3173306" y="2837910"/>
+            <a:ext cx="3498255" cy="917649"/>
+            <a:chOff x="3169161" y="2846783"/>
+            <a:chExt cx="3498255" cy="917649"/>
           </a:xfrm>
-          <a:prstGeom prst="rect">
-            <a:avLst/>
-          </a:prstGeom>
-          <a:solidFill>
-            <a:srgbClr val="FFC000"/>
-          </a:solidFill>
-        </p:spPr>
-        <p:style>
-          <a:lnRef idx="1">
-            <a:schemeClr val="accent1"/>
-          </a:lnRef>
-          <a:fillRef idx="3">
-            <a:schemeClr val="accent1"/>
-          </a:fillRef>
-          <a:effectRef idx="2">
-            <a:schemeClr val="accent1"/>
-          </a:effectRef>
-          <a:fontRef idx="minor">
-            <a:schemeClr val="lt1"/>
-          </a:fontRef>
-        </p:style>
-        <p:txBody>
-          <a:bodyPr rtlCol="0" anchor="t" anchorCtr="0"/>
-          <a:lstStyle/>
-          <a:p>
-            <a:endParaRPr lang="en-GB" dirty="0"/>
-          </a:p>
-          <a:p>
-            <a:r>
-              <a:rPr lang="en-GB" dirty="0"/>
-              <a:t>Server App</a:t>
-            </a:r>
-          </a:p>
-          <a:p>
-            <a:endParaRPr lang="en-GB" dirty="0"/>
-          </a:p>
-          <a:p>
-            <a:r>
-              <a:rPr lang="en-GB" dirty="0" err="1"/>
-              <a:t>Dex</a:t>
-            </a:r>
-            <a:r>
-              <a:rPr lang="en-GB" dirty="0"/>
-              <a:t> Provider</a:t>
-            </a:r>
-            <a:endParaRPr lang="en-NL" dirty="0"/>
-          </a:p>
-        </p:txBody>
-      </p:sp>
-      <p:sp>
-        <p:nvSpPr>
-          <p:cNvPr id="6" name="Rectangle 5">
-            <a:extLst>
-              <a:ext uri="{FF2B5EF4-FFF2-40B4-BE49-F238E27FC236}">
-                <a16:creationId xmlns:a16="http://schemas.microsoft.com/office/drawing/2014/main" id="{DAF1EFE4-50E6-47AB-98D5-F9367ACD1501}"/>
-              </a:ext>
-            </a:extLst>
-          </p:cNvPr>
-          <p:cNvSpPr/>
-          <p:nvPr/>
-        </p:nvSpPr>
-        <p:spPr>
-          <a:xfrm>
-            <a:off x="5030222" y="2580166"/>
-            <a:ext cx="1747096" cy="1679947"/>
-          </a:xfrm>
-          <a:prstGeom prst="rect">
-            <a:avLst/>
-          </a:prstGeom>
-          <a:solidFill>
-            <a:srgbClr val="FFFF99"/>
-          </a:solidFill>
-        </p:spPr>
-        <p:style>
-          <a:lnRef idx="1">
-            <a:schemeClr val="accent6"/>
-          </a:lnRef>
-          <a:fillRef idx="3">
-            <a:schemeClr val="accent6"/>
-          </a:fillRef>
-          <a:effectRef idx="2">
-            <a:schemeClr val="accent6"/>
-          </a:effectRef>
-          <a:fontRef idx="minor">
-            <a:schemeClr val="lt1"/>
-          </a:fontRef>
-        </p:style>
-        <p:txBody>
-          <a:bodyPr rtlCol="0" anchor="t" anchorCtr="0"/>
-          <a:lstStyle/>
-          <a:p>
-            <a:endParaRPr lang="en-GB" dirty="0">
-              <a:solidFill>
-                <a:schemeClr val="tx1"/>
-              </a:solidFill>
-            </a:endParaRPr>
-          </a:p>
-          <a:p>
-            <a:r>
-              <a:rPr lang="en-GB" dirty="0">
+        </p:grpSpPr>
+        <p:sp>
+          <p:nvSpPr>
+            <p:cNvPr id="5" name="Rectangle 4">
+              <a:extLst>
+                <a:ext uri="{FF2B5EF4-FFF2-40B4-BE49-F238E27FC236}">
+                  <a16:creationId xmlns:a16="http://schemas.microsoft.com/office/drawing/2014/main" id="{3BFD8162-564D-510A-E00E-64FDECD0D188}"/>
+                </a:ext>
+              </a:extLst>
+            </p:cNvPr>
+            <p:cNvSpPr/>
+            <p:nvPr/>
+          </p:nvSpPr>
+          <p:spPr>
+            <a:xfrm>
+              <a:off x="3169161" y="2846783"/>
+              <a:ext cx="1753273" cy="917649"/>
+            </a:xfrm>
+            <a:prstGeom prst="rect">
+              <a:avLst/>
+            </a:prstGeom>
+            <a:solidFill>
+              <a:schemeClr val="accent2"/>
+            </a:solidFill>
+            <a:ln>
+              <a:noFill/>
+            </a:ln>
+          </p:spPr>
+          <p:style>
+            <a:lnRef idx="1">
+              <a:schemeClr val="accent1"/>
+            </a:lnRef>
+            <a:fillRef idx="3">
+              <a:schemeClr val="accent1"/>
+            </a:fillRef>
+            <a:effectRef idx="2">
+              <a:schemeClr val="accent1"/>
+            </a:effectRef>
+            <a:fontRef idx="minor">
+              <a:schemeClr val="lt1"/>
+            </a:fontRef>
+          </p:style>
+          <p:txBody>
+            <a:bodyPr rtlCol="0" anchor="t" anchorCtr="0"/>
+            <a:lstStyle/>
+            <a:p>
+              <a:pPr algn="ctr"/>
+              <a:r>
+                <a:rPr lang="en-GB" dirty="0">
+                  <a:latin typeface="Avenir Next LT Pro" panose="020B0504020202020204" pitchFamily="34" charset="0"/>
+                </a:rPr>
+                <a:t>Server App</a:t>
+              </a:r>
+            </a:p>
+            <a:p>
+              <a:pPr algn="ctr"/>
+              <a:endParaRPr lang="en-GB" dirty="0">
+                <a:latin typeface="Avenir Next LT Pro" panose="020B0504020202020204" pitchFamily="34" charset="0"/>
+              </a:endParaRPr>
+            </a:p>
+            <a:p>
+              <a:pPr algn="ctr"/>
+              <a:r>
+                <a:rPr lang="en-GB" dirty="0" err="1">
+                  <a:latin typeface="Avenir Next LT Pro" panose="020B0504020202020204" pitchFamily="34" charset="0"/>
+                </a:rPr>
+                <a:t>Dex</a:t>
+              </a:r>
+              <a:r>
+                <a:rPr lang="en-GB" dirty="0">
+                  <a:latin typeface="Avenir Next LT Pro" panose="020B0504020202020204" pitchFamily="34" charset="0"/>
+                </a:rPr>
+                <a:t> Provider</a:t>
+              </a:r>
+              <a:endParaRPr lang="en-NL" dirty="0">
+                <a:latin typeface="Avenir Next LT Pro" panose="020B0504020202020204" pitchFamily="34" charset="0"/>
+              </a:endParaRPr>
+            </a:p>
+          </p:txBody>
+        </p:sp>
+        <p:sp>
+          <p:nvSpPr>
+            <p:cNvPr id="6" name="Rectangle 5">
+              <a:extLst>
+                <a:ext uri="{FF2B5EF4-FFF2-40B4-BE49-F238E27FC236}">
+                  <a16:creationId xmlns:a16="http://schemas.microsoft.com/office/drawing/2014/main" id="{DAF1EFE4-50E6-47AB-98D5-F9367ACD1501}"/>
+                </a:ext>
+              </a:extLst>
+            </p:cNvPr>
+            <p:cNvSpPr/>
+            <p:nvPr/>
+          </p:nvSpPr>
+          <p:spPr>
+            <a:xfrm>
+              <a:off x="4920320" y="2846783"/>
+              <a:ext cx="1747096" cy="917649"/>
+            </a:xfrm>
+            <a:prstGeom prst="rect">
+              <a:avLst/>
+            </a:prstGeom>
+            <a:solidFill>
+              <a:schemeClr val="accent3"/>
+            </a:solidFill>
+            <a:ln>
+              <a:noFill/>
+            </a:ln>
+          </p:spPr>
+          <p:style>
+            <a:lnRef idx="0">
+              <a:scrgbClr r="0" g="0" b="0"/>
+            </a:lnRef>
+            <a:fillRef idx="0">
+              <a:scrgbClr r="0" g="0" b="0"/>
+            </a:fillRef>
+            <a:effectRef idx="0">
+              <a:scrgbClr r="0" g="0" b="0"/>
+            </a:effectRef>
+            <a:fontRef idx="minor">
+              <a:schemeClr val="lt1"/>
+            </a:fontRef>
+          </p:style>
+          <p:txBody>
+            <a:bodyPr rtlCol="0" anchor="t" anchorCtr="0"/>
+            <a:lstStyle/>
+            <a:p>
+              <a:pPr algn="ctr"/>
+              <a:r>
+                <a:rPr lang="en-GB" dirty="0">
+                  <a:solidFill>
+                    <a:schemeClr val="bg1"/>
+                  </a:solidFill>
+                  <a:latin typeface="Avenir Next LT Pro" panose="020B0504020202020204" pitchFamily="34" charset="0"/>
+                </a:rPr>
+                <a:t>Client App</a:t>
+              </a:r>
+            </a:p>
+            <a:p>
+              <a:pPr algn="ctr"/>
+              <a:endParaRPr lang="en-GB" dirty="0">
                 <a:solidFill>
-                  <a:schemeClr val="tx1"/>
+                  <a:schemeClr val="bg1"/>
                 </a:solidFill>
-              </a:rPr>
-              <a:t>Client App</a:t>
-            </a:r>
-          </a:p>
-          <a:p>
-            <a:endParaRPr lang="en-GB" dirty="0">
-              <a:solidFill>
-                <a:schemeClr val="tx1"/>
-              </a:solidFill>
-            </a:endParaRPr>
-          </a:p>
-          <a:p>
-            <a:r>
-              <a:rPr lang="en-GB" dirty="0" err="1">
+                <a:latin typeface="Avenir Next LT Pro" panose="020B0504020202020204" pitchFamily="34" charset="0"/>
+              </a:endParaRPr>
+            </a:p>
+            <a:p>
+              <a:pPr algn="ctr"/>
+              <a:r>
+                <a:rPr lang="en-GB" dirty="0" err="1">
+                  <a:solidFill>
+                    <a:schemeClr val="bg1"/>
+                  </a:solidFill>
+                  <a:latin typeface="Avenir Next LT Pro" panose="020B0504020202020204" pitchFamily="34" charset="0"/>
+                </a:rPr>
+                <a:t>Dex</a:t>
+              </a:r>
+              <a:r>
+                <a:rPr lang="en-GB" dirty="0">
+                  <a:solidFill>
+                    <a:schemeClr val="bg1"/>
+                  </a:solidFill>
+                  <a:latin typeface="Avenir Next LT Pro" panose="020B0504020202020204" pitchFamily="34" charset="0"/>
+                </a:rPr>
+                <a:t> Client</a:t>
+              </a:r>
+              <a:endParaRPr lang="en-NL" dirty="0">
                 <a:solidFill>
-                  <a:schemeClr val="tx1"/>
+                  <a:schemeClr val="bg1"/>
                 </a:solidFill>
-              </a:rPr>
-              <a:t>Dex</a:t>
-            </a:r>
-            <a:r>
-              <a:rPr lang="en-GB" dirty="0">
-                <a:solidFill>
-                  <a:schemeClr val="tx1"/>
-                </a:solidFill>
-              </a:rPr>
-              <a:t> Client</a:t>
-            </a:r>
-            <a:endParaRPr lang="en-NL" dirty="0">
-              <a:solidFill>
-                <a:schemeClr val="tx1"/>
-              </a:solidFill>
-            </a:endParaRPr>
-          </a:p>
-        </p:txBody>
-      </p:sp>
+                <a:latin typeface="Avenir Next LT Pro" panose="020B0504020202020204" pitchFamily="34" charset="0"/>
+              </a:endParaRPr>
+            </a:p>
+          </p:txBody>
+        </p:sp>
+      </p:grpSp>
       <p:cxnSp>
         <p:nvCxnSpPr>
           <p:cNvPr id="7" name="Straight Arrow Connector 6">
@@ -10900,7 +10979,7 @@
           </a:prstGeom>
           <a:ln w="76200">
             <a:solidFill>
-              <a:srgbClr val="FFC000"/>
+              <a:schemeClr val="accent5"/>
             </a:solidFill>
             <a:tailEnd type="triangle"/>
           </a:ln>
@@ -10936,7 +11015,7 @@
         </p:nvCxnSpPr>
         <p:spPr>
           <a:xfrm flipH="1">
-            <a:off x="1403759" y="3858413"/>
+            <a:off x="1403759" y="3740472"/>
             <a:ext cx="1711250" cy="0"/>
           </a:xfrm>
           <a:prstGeom prst="straightConnector1">
@@ -10944,10 +11023,7 @@
           </a:prstGeom>
           <a:ln w="76200">
             <a:solidFill>
-              <a:schemeClr val="accent5">
-                <a:lumMod val="60000"/>
-                <a:lumOff val="40000"/>
-              </a:schemeClr>
+              <a:schemeClr val="accent5"/>
             </a:solidFill>
             <a:tailEnd type="triangle"/>
           </a:ln>
@@ -10991,7 +11067,7 @@
           </a:prstGeom>
           <a:ln w="76200">
             <a:solidFill>
-              <a:srgbClr val="FFC000"/>
+              <a:schemeClr val="accent5"/>
             </a:solidFill>
             <a:tailEnd type="triangle"/>
           </a:ln>
@@ -11035,10 +11111,7 @@
           </a:prstGeom>
           <a:ln w="76200">
             <a:solidFill>
-              <a:schemeClr val="accent5">
-                <a:lumMod val="60000"/>
-                <a:lumOff val="40000"/>
-              </a:schemeClr>
+              <a:schemeClr val="accent5"/>
             </a:solidFill>
             <a:tailEnd type="triangle"/>
           </a:ln>
@@ -11092,6 +11165,7 @@
                     <a:lumMod val="65000"/>
                   </a:schemeClr>
                 </a:solidFill>
+                <a:latin typeface="Avenir Next LT Pro" panose="020B0504020202020204" pitchFamily="34" charset="0"/>
               </a:rPr>
               <a:t>Exposing Service</a:t>
             </a:r>
@@ -11101,6 +11175,7 @@
                   <a:lumMod val="65000"/>
                 </a:schemeClr>
               </a:solidFill>
+              <a:latin typeface="Avenir Next LT Pro" panose="020B0504020202020204" pitchFamily="34" charset="0"/>
             </a:endParaRPr>
           </a:p>
         </p:txBody>
@@ -11139,6 +11214,7 @@
                     <a:lumMod val="65000"/>
                   </a:schemeClr>
                 </a:solidFill>
+                <a:latin typeface="Avenir Next LT Pro" panose="020B0504020202020204" pitchFamily="34" charset="0"/>
               </a:rPr>
               <a:t>Deploying Service</a:t>
             </a:r>
@@ -11148,6 +11224,7 @@
                   <a:lumMod val="65000"/>
                 </a:schemeClr>
               </a:solidFill>
+              <a:latin typeface="Avenir Next LT Pro" panose="020B0504020202020204" pitchFamily="34" charset="0"/>
             </a:endParaRPr>
           </a:p>
         </p:txBody>
@@ -11284,12 +11361,18 @@
         </p:nvSpPr>
         <p:spPr>
           <a:xfrm>
-            <a:off x="3962400" y="3429000"/>
-            <a:ext cx="1638082" cy="1199708"/>
+            <a:off x="3962400" y="3477751"/>
+            <a:ext cx="1638082" cy="980771"/>
           </a:xfrm>
           <a:prstGeom prst="rect">
             <a:avLst/>
           </a:prstGeom>
+          <a:solidFill>
+            <a:schemeClr val="tx2"/>
+          </a:solidFill>
+          <a:ln>
+            <a:noFill/>
+          </a:ln>
         </p:spPr>
         <p:style>
           <a:lnRef idx="1">
@@ -11311,10 +11394,14 @@
           <a:p>
             <a:pPr algn="ctr"/>
             <a:r>
-              <a:rPr lang="en-GB" dirty="0"/>
+              <a:rPr lang="en-GB" dirty="0">
+                <a:latin typeface="Avenir Next LT Pro" panose="020B0504020202020204" pitchFamily="34" charset="0"/>
+              </a:rPr>
               <a:t>AIMMS Published App</a:t>
             </a:r>
-            <a:endParaRPr lang="en-NL" dirty="0"/>
+            <a:endParaRPr lang="en-NL" dirty="0">
+              <a:latin typeface="Avenir Next LT Pro" panose="020B0504020202020204" pitchFamily="34" charset="0"/>
+            </a:endParaRPr>
           </a:p>
         </p:txBody>
       </p:sp>
@@ -11335,8 +11422,8 @@
         </p:nvCxnSpPr>
         <p:spPr>
           <a:xfrm>
-            <a:off x="2814918" y="3245224"/>
-            <a:ext cx="1147482" cy="783630"/>
+            <a:off x="2748930" y="3663050"/>
+            <a:ext cx="1213470" cy="305087"/>
           </a:xfrm>
           <a:prstGeom prst="straightConnector1">
             <a:avLst/>
@@ -11375,14 +11462,15 @@
           </p:cNvPr>
           <p:cNvCxnSpPr>
             <a:cxnSpLocks/>
+            <a:stCxn id="30" idx="3"/>
             <a:endCxn id="9" idx="1"/>
           </p:cNvCxnSpPr>
           <p:nvPr/>
         </p:nvCxnSpPr>
         <p:spPr>
-          <a:xfrm flipV="1">
-            <a:off x="2814918" y="4028854"/>
-            <a:ext cx="1147482" cy="90395"/>
+          <a:xfrm>
+            <a:off x="2713848" y="3968136"/>
+            <a:ext cx="1248552" cy="1"/>
           </a:xfrm>
           <a:prstGeom prst="straightConnector1">
             <a:avLst/>
@@ -11427,8 +11515,8 @@
         </p:nvCxnSpPr>
         <p:spPr>
           <a:xfrm flipV="1">
-            <a:off x="3055172" y="4028854"/>
-            <a:ext cx="907228" cy="783630"/>
+            <a:off x="2748930" y="3968137"/>
+            <a:ext cx="1213470" cy="305086"/>
           </a:xfrm>
           <a:prstGeom prst="straightConnector1">
             <a:avLst/>
@@ -11467,13 +11555,14 @@
           </p:cNvPr>
           <p:cNvCxnSpPr>
             <a:cxnSpLocks/>
+            <a:stCxn id="9" idx="3"/>
           </p:cNvCxnSpPr>
           <p:nvPr/>
         </p:nvCxnSpPr>
         <p:spPr>
           <a:xfrm flipV="1">
-            <a:off x="5615494" y="3466742"/>
-            <a:ext cx="1384148" cy="507966"/>
+            <a:off x="5600482" y="3663050"/>
+            <a:ext cx="1290706" cy="305087"/>
           </a:xfrm>
           <a:prstGeom prst="straightConnector1">
             <a:avLst/>
@@ -11512,13 +11601,15 @@
           </p:cNvPr>
           <p:cNvCxnSpPr>
             <a:cxnSpLocks/>
+            <a:stCxn id="9" idx="3"/>
+            <a:endCxn id="29" idx="1"/>
           </p:cNvCxnSpPr>
           <p:nvPr/>
         </p:nvCxnSpPr>
         <p:spPr>
-          <a:xfrm>
-            <a:off x="5600482" y="3974708"/>
-            <a:ext cx="1399160" cy="0"/>
+          <a:xfrm flipV="1">
+            <a:off x="5600482" y="3968136"/>
+            <a:ext cx="1275466" cy="1"/>
           </a:xfrm>
           <a:prstGeom prst="straightConnector1">
             <a:avLst/>
@@ -11557,13 +11648,14 @@
           </p:cNvPr>
           <p:cNvCxnSpPr>
             <a:cxnSpLocks/>
+            <a:stCxn id="9" idx="3"/>
           </p:cNvCxnSpPr>
           <p:nvPr/>
         </p:nvCxnSpPr>
         <p:spPr>
           <a:xfrm>
-            <a:off x="5600482" y="3974708"/>
-            <a:ext cx="1399160" cy="483703"/>
+            <a:off x="5600482" y="3968137"/>
+            <a:ext cx="1275466" cy="305086"/>
           </a:xfrm>
           <a:prstGeom prst="straightConnector1">
             <a:avLst/>
@@ -11605,8 +11697,8 @@
         </p:nvSpPr>
         <p:spPr>
           <a:xfrm>
-            <a:off x="7377680" y="3429000"/>
-            <a:ext cx="1065552" cy="1085049"/>
+            <a:off x="6875948" y="3496417"/>
+            <a:ext cx="1187200" cy="943438"/>
           </a:xfrm>
           <a:prstGeom prst="rect">
             <a:avLst/>
@@ -11625,6 +11717,7 @@
                     <a:lumMod val="65000"/>
                   </a:schemeClr>
                 </a:solidFill>
+                <a:latin typeface="Avenir Next LT Pro" panose="020B0504020202020204" pitchFamily="34" charset="0"/>
               </a:rPr>
               <a:t>Client of Several Services</a:t>
             </a:r>
@@ -11634,6 +11727,7 @@
                   <a:lumMod val="65000"/>
                 </a:schemeClr>
               </a:solidFill>
+              <a:latin typeface="Avenir Next LT Pro" panose="020B0504020202020204" pitchFamily="34" charset="0"/>
             </a:endParaRPr>
           </a:p>
         </p:txBody>
@@ -11652,8 +11746,8 @@
         </p:nvSpPr>
         <p:spPr>
           <a:xfrm>
-            <a:off x="1452282" y="3660544"/>
-            <a:ext cx="1298090" cy="980772"/>
+            <a:off x="1415758" y="3496417"/>
+            <a:ext cx="1298090" cy="943438"/>
           </a:xfrm>
           <a:prstGeom prst="rect">
             <a:avLst/>
@@ -11665,6 +11759,7 @@
           </a:bodyPr>
           <a:lstStyle/>
           <a:p>
+            <a:pPr algn="r"/>
             <a:r>
               <a:rPr lang="en-GB" sz="1800" cap="none" baseline="0" dirty="0">
                 <a:solidFill>
@@ -11672,6 +11767,7 @@
                     <a:lumMod val="65000"/>
                   </a:schemeClr>
                 </a:solidFill>
+                <a:latin typeface="Avenir Next LT Pro" panose="020B0504020202020204" pitchFamily="34" charset="0"/>
               </a:rPr>
               <a:t>Exposed to Several Clients</a:t>
             </a:r>
@@ -11681,6 +11777,7 @@
                   <a:lumMod val="65000"/>
                 </a:schemeClr>
               </a:solidFill>
+              <a:latin typeface="Avenir Next LT Pro" panose="020B0504020202020204" pitchFamily="34" charset="0"/>
             </a:endParaRPr>
           </a:p>
         </p:txBody>
@@ -14584,18 +14681,18 @@
 </file>
 
 <file path=customXml/item1.xml><?xml version="1.0" encoding="utf-8"?>
-<p:properties xmlns:p="http://schemas.microsoft.com/office/2006/metadata/properties" xmlns:xsi="http://www.w3.org/2001/XMLSchema-instance" xmlns:pc="http://schemas.microsoft.com/office/infopath/2007/PartnerControls">
-  <documentManagement/>
-</p:properties>
-</file>
-
-<file path=customXml/item2.xml><?xml version="1.0" encoding="utf-8"?>
 <?mso-contentType ?>
 <FormTemplates xmlns="http://schemas.microsoft.com/sharepoint/v3/contenttype/forms">
   <Display>DocumentLibraryForm</Display>
   <Edit>DocumentLibraryForm</Edit>
   <New>DocumentLibraryForm</New>
 </FormTemplates>
+</file>
+
+<file path=customXml/item2.xml><?xml version="1.0" encoding="utf-8"?>
+<p:properties xmlns:p="http://schemas.microsoft.com/office/2006/metadata/properties" xmlns:xsi="http://www.w3.org/2001/XMLSchema-instance" xmlns:pc="http://schemas.microsoft.com/office/infopath/2007/PartnerControls">
+  <documentManagement/>
+</p:properties>
 </file>
 
 <file path=customXml/item3.xml><?xml version="1.0" encoding="utf-8"?>
@@ -14753,6 +14850,14 @@
 </file>
 
 <file path=customXml/itemProps1.xml><?xml version="1.0" encoding="utf-8"?>
+<ds:datastoreItem xmlns:ds="http://schemas.openxmlformats.org/officeDocument/2006/customXml" ds:itemID="{74BCA57B-8451-400D-AF6D-A9DBB4806AF2}">
+  <ds:schemaRefs>
+    <ds:schemaRef ds:uri="http://schemas.microsoft.com/sharepoint/v3/contenttype/forms"/>
+  </ds:schemaRefs>
+</ds:datastoreItem>
+</file>
+
+<file path=customXml/itemProps2.xml><?xml version="1.0" encoding="utf-8"?>
 <ds:datastoreItem xmlns:ds="http://schemas.openxmlformats.org/officeDocument/2006/customXml" ds:itemID="{F4BD4880-0C9A-491D-872C-CB84E58DA4AE}">
   <ds:schemaRefs>
     <ds:schemaRef ds:uri="67d1ba68-3275-44c2-9ddb-2f8511f2ccbb"/>
@@ -14764,14 +14869,6 @@
     <ds:schemaRef ds:uri="http://schemas.microsoft.com/office/2006/metadata/properties"/>
     <ds:schemaRef ds:uri="http://www.w3.org/XML/1998/namespace"/>
     <ds:schemaRef ds:uri="http://purl.org/dc/dcmitype/"/>
-  </ds:schemaRefs>
-</ds:datastoreItem>
-</file>
-
-<file path=customXml/itemProps2.xml><?xml version="1.0" encoding="utf-8"?>
-<ds:datastoreItem xmlns:ds="http://schemas.openxmlformats.org/officeDocument/2006/customXml" ds:itemID="{74BCA57B-8451-400D-AF6D-A9DBB4806AF2}">
-  <ds:schemaRefs>
-    <ds:schemaRef ds:uri="http://schemas.microsoft.com/sharepoint/v3/contenttype/forms"/>
   </ds:schemaRefs>
 </ds:datastoreItem>
 </file>

</xml_diff>